<commit_message>
Updated LinuxAdm, added GIT
</commit_message>
<xml_diff>
--- a/LinuxAdm/LinuxAdm1.pptx
+++ b/LinuxAdm/LinuxAdm1.pptx
@@ -268,7 +268,7 @@
           <a:p>
             <a:fld id="{052ECE81-C73C-E543-9046-300010F65159}" type="datetimeFigureOut">
               <a:rPr lang="en-RU" smtClean="0"/>
-              <a:t>20.12.2020</a:t>
+              <a:t>21.12.2020</a:t>
             </a:fld>
             <a:endParaRPr lang="en-RU"/>
           </a:p>
@@ -468,7 +468,7 @@
           <a:p>
             <a:fld id="{052ECE81-C73C-E543-9046-300010F65159}" type="datetimeFigureOut">
               <a:rPr lang="en-RU" smtClean="0"/>
-              <a:t>20.12.2020</a:t>
+              <a:t>21.12.2020</a:t>
             </a:fld>
             <a:endParaRPr lang="en-RU"/>
           </a:p>
@@ -678,7 +678,7 @@
           <a:p>
             <a:fld id="{052ECE81-C73C-E543-9046-300010F65159}" type="datetimeFigureOut">
               <a:rPr lang="en-RU" smtClean="0"/>
-              <a:t>20.12.2020</a:t>
+              <a:t>21.12.2020</a:t>
             </a:fld>
             <a:endParaRPr lang="en-RU"/>
           </a:p>
@@ -1145,7 +1145,7 @@
           <a:p>
             <a:fld id="{052ECE81-C73C-E543-9046-300010F65159}" type="datetimeFigureOut">
               <a:rPr lang="en-RU" smtClean="0"/>
-              <a:t>20.12.2020</a:t>
+              <a:t>21.12.2020</a:t>
             </a:fld>
             <a:endParaRPr lang="en-RU"/>
           </a:p>
@@ -1421,7 +1421,7 @@
           <a:p>
             <a:fld id="{052ECE81-C73C-E543-9046-300010F65159}" type="datetimeFigureOut">
               <a:rPr lang="en-RU" smtClean="0"/>
-              <a:t>20.12.2020</a:t>
+              <a:t>21.12.2020</a:t>
             </a:fld>
             <a:endParaRPr lang="en-RU"/>
           </a:p>
@@ -1689,7 +1689,7 @@
           <a:p>
             <a:fld id="{052ECE81-C73C-E543-9046-300010F65159}" type="datetimeFigureOut">
               <a:rPr lang="en-RU" smtClean="0"/>
-              <a:t>20.12.2020</a:t>
+              <a:t>21.12.2020</a:t>
             </a:fld>
             <a:endParaRPr lang="en-RU"/>
           </a:p>
@@ -2104,7 +2104,7 @@
           <a:p>
             <a:fld id="{052ECE81-C73C-E543-9046-300010F65159}" type="datetimeFigureOut">
               <a:rPr lang="en-RU" smtClean="0"/>
-              <a:t>20.12.2020</a:t>
+              <a:t>21.12.2020</a:t>
             </a:fld>
             <a:endParaRPr lang="en-RU"/>
           </a:p>
@@ -2246,7 +2246,7 @@
           <a:p>
             <a:fld id="{052ECE81-C73C-E543-9046-300010F65159}" type="datetimeFigureOut">
               <a:rPr lang="en-RU" smtClean="0"/>
-              <a:t>20.12.2020</a:t>
+              <a:t>21.12.2020</a:t>
             </a:fld>
             <a:endParaRPr lang="en-RU"/>
           </a:p>
@@ -2359,7 +2359,7 @@
           <a:p>
             <a:fld id="{052ECE81-C73C-E543-9046-300010F65159}" type="datetimeFigureOut">
               <a:rPr lang="en-RU" smtClean="0"/>
-              <a:t>20.12.2020</a:t>
+              <a:t>21.12.2020</a:t>
             </a:fld>
             <a:endParaRPr lang="en-RU"/>
           </a:p>
@@ -2672,7 +2672,7 @@
           <a:p>
             <a:fld id="{052ECE81-C73C-E543-9046-300010F65159}" type="datetimeFigureOut">
               <a:rPr lang="en-RU" smtClean="0"/>
-              <a:t>20.12.2020</a:t>
+              <a:t>21.12.2020</a:t>
             </a:fld>
             <a:endParaRPr lang="en-RU"/>
           </a:p>
@@ -2961,7 +2961,7 @@
           <a:p>
             <a:fld id="{052ECE81-C73C-E543-9046-300010F65159}" type="datetimeFigureOut">
               <a:rPr lang="en-RU" smtClean="0"/>
-              <a:t>20.12.2020</a:t>
+              <a:t>21.12.2020</a:t>
             </a:fld>
             <a:endParaRPr lang="en-RU"/>
           </a:p>
@@ -3204,7 +3204,7 @@
           <a:p>
             <a:fld id="{052ECE81-C73C-E543-9046-300010F65159}" type="datetimeFigureOut">
               <a:rPr lang="en-RU" smtClean="0"/>
-              <a:t>20.12.2020</a:t>
+              <a:t>21.12.2020</a:t>
             </a:fld>
             <a:endParaRPr lang="en-RU"/>
           </a:p>
@@ -3710,31 +3710,6 @@
       </p:grpSpPr>
       <p:sp>
         <p:nvSpPr>
-          <p:cNvPr id="2" name="Content Placeholder 1">
-            <a:extLst>
-              <a:ext uri="{FF2B5EF4-FFF2-40B4-BE49-F238E27FC236}">
-                <a16:creationId xmlns:a16="http://schemas.microsoft.com/office/drawing/2014/main" id="{5BA0F083-B66A-4CF4-8CE4-B01CF146F152}"/>
-              </a:ext>
-            </a:extLst>
-          </p:cNvPr>
-          <p:cNvSpPr>
-            <a:spLocks noGrp="1"/>
-          </p:cNvSpPr>
-          <p:nvPr>
-            <p:ph idx="1"/>
-          </p:nvPr>
-        </p:nvSpPr>
-        <p:spPr/>
-        <p:txBody>
-          <a:bodyPr/>
-          <a:lstStyle/>
-          <a:p>
-            <a:endParaRPr lang="en-US" dirty="0"/>
-          </a:p>
-        </p:txBody>
-      </p:sp>
-      <p:sp>
-        <p:nvSpPr>
           <p:cNvPr id="3" name="Text Placeholder 2">
             <a:extLst>
               <a:ext uri="{FF2B5EF4-FFF2-40B4-BE49-F238E27FC236}">
@@ -3816,7 +3791,10 @@
               <a:rPr lang="en-US" dirty="0" err="1"/>
               <a:t>gcc</a:t>
             </a:r>
-            <a:endParaRPr lang="en-US" dirty="0"/>
+            <a:r>
+              <a:rPr lang="en-US" dirty="0"/>
+              <a:t> - gnu C compiler</a:t>
+            </a:r>
           </a:p>
         </p:txBody>
       </p:sp>
@@ -3834,7 +3812,7 @@
         </p:nvSpPr>
         <p:spPr>
           <a:xfrm>
-            <a:off x="947854" y="1817649"/>
+            <a:off x="1349297" y="1828800"/>
             <a:ext cx="4627756" cy="646331"/>
           </a:xfrm>
           <a:prstGeom prst="rect">
@@ -3879,6 +3857,64 @@
               <a:rPr lang="en-GB" dirty="0"/>
               <a:t> -o prog</a:t>
             </a:r>
+            <a:endParaRPr lang="en-RU" dirty="0"/>
+          </a:p>
+        </p:txBody>
+      </p:sp>
+      <p:sp>
+        <p:nvSpPr>
+          <p:cNvPr id="2" name="TextBox 1">
+            <a:extLst>
+              <a:ext uri="{FF2B5EF4-FFF2-40B4-BE49-F238E27FC236}">
+                <a16:creationId xmlns:a16="http://schemas.microsoft.com/office/drawing/2014/main" id="{70D75354-D7A8-4A4F-846D-56FCD6AE9149}"/>
+              </a:ext>
+            </a:extLst>
+          </p:cNvPr>
+          <p:cNvSpPr txBox="1"/>
+          <p:nvPr/>
+        </p:nvSpPr>
+        <p:spPr>
+          <a:xfrm>
+            <a:off x="1906859" y="3412272"/>
+            <a:ext cx="4839629" cy="1477328"/>
+          </a:xfrm>
+          <a:prstGeom prst="rect">
+            <a:avLst/>
+          </a:prstGeom>
+          <a:noFill/>
+        </p:spPr>
+        <p:txBody>
+          <a:bodyPr wrap="square" rtlCol="0">
+            <a:spAutoFit/>
+          </a:bodyPr>
+          <a:lstStyle/>
+          <a:p>
+            <a:r>
+              <a:rPr lang="en-GB" dirty="0"/>
+              <a:t>b</a:t>
+            </a:r>
+            <a:r>
+              <a:rPr lang="en-RU" dirty="0"/>
+              <a:t>ash, python, perl, ruby</a:t>
+            </a:r>
+          </a:p>
+          <a:p>
+            <a:endParaRPr lang="en-RU" dirty="0"/>
+          </a:p>
+          <a:p>
+            <a:r>
+              <a:rPr lang="en-GB" dirty="0"/>
+              <a:t>o</a:t>
+            </a:r>
+            <a:r>
+              <a:rPr lang="en-RU" dirty="0"/>
+              <a:t>ne-by-one</a:t>
+            </a:r>
+          </a:p>
+          <a:p>
+            <a:endParaRPr lang="en-RU" dirty="0"/>
+          </a:p>
+          <a:p>
             <a:endParaRPr lang="en-RU" dirty="0"/>
           </a:p>
         </p:txBody>
@@ -3956,7 +3992,7 @@
         <p:spPr>
           <a:xfrm>
             <a:off x="7742664" y="1518996"/>
-            <a:ext cx="3486616" cy="4893647"/>
+            <a:ext cx="3486616" cy="5262979"/>
           </a:xfrm>
           <a:prstGeom prst="rect">
             <a:avLst/>
@@ -4195,6 +4231,15 @@
             <a:r>
               <a:rPr lang="en-GB" sz="1200" dirty="0"/>
               <a:t> foo</a:t>
+            </a:r>
+          </a:p>
+          <a:p>
+            <a:endParaRPr lang="en-GB" sz="1200" dirty="0"/>
+          </a:p>
+          <a:p>
+            <a:r>
+              <a:rPr lang="en-GB" sz="1200" dirty="0"/>
+              <a:t>install: #install files into OS</a:t>
             </a:r>
             <a:endParaRPr lang="en-RU" sz="1200" dirty="0"/>
           </a:p>
@@ -4321,7 +4366,7 @@
             </a:r>
             <a:r>
               <a:rPr lang="en-RU" dirty="0"/>
-              <a:t>ake install clean   # Cleans built artefacts</a:t>
+              <a:t>ake clean               # Cleans built artefacts</a:t>
             </a:r>
           </a:p>
         </p:txBody>
@@ -4379,7 +4424,31 @@
           <a:p>
             <a:r>
               <a:rPr lang="en-US" dirty="0"/>
-              <a:t>install</a:t>
+              <a:t>install  ~~~ cp, </a:t>
+            </a:r>
+            <a:r>
+              <a:rPr lang="en-US" dirty="0" err="1"/>
+              <a:t>chown</a:t>
+            </a:r>
+            <a:r>
+              <a:rPr lang="en-US" dirty="0"/>
+              <a:t>, </a:t>
+            </a:r>
+            <a:r>
+              <a:rPr lang="en-US" dirty="0" err="1"/>
+              <a:t>chmod</a:t>
+            </a:r>
+            <a:r>
+              <a:rPr lang="en-US" dirty="0"/>
+              <a:t>, strip, </a:t>
+            </a:r>
+            <a:r>
+              <a:rPr lang="en-US" dirty="0" err="1"/>
+              <a:t>mkdir</a:t>
+            </a:r>
+            <a:r>
+              <a:rPr lang="en-US" dirty="0"/>
+              <a:t>.</a:t>
             </a:r>
           </a:p>
         </p:txBody>
@@ -4608,8 +4677,13 @@
             </a:r>
             <a:r>
               <a:rPr lang="en-US" dirty="0"/>
-              <a:t>, rpm</a:t>
-            </a:r>
+              <a:t>, rpm – </a:t>
+            </a:r>
+            <a:r>
+              <a:rPr lang="ru-RU" dirty="0"/>
+              <a:t>управление пакетами</a:t>
+            </a:r>
+            <a:endParaRPr lang="en-US" dirty="0"/>
           </a:p>
         </p:txBody>
       </p:sp>
@@ -4957,6 +5031,19 @@
               <a:rPr lang="en-US" dirty="0"/>
               <a:t>apt*, yum</a:t>
             </a:r>
+            <a:r>
+              <a:rPr lang="ru-RU" dirty="0"/>
+              <a:t>(</a:t>
+            </a:r>
+            <a:r>
+              <a:rPr lang="en-US" dirty="0" err="1"/>
+              <a:t>dnf</a:t>
+            </a:r>
+            <a:r>
+              <a:rPr lang="ru-RU" dirty="0"/>
+              <a:t>) – управление зависимостями пакетов</a:t>
+            </a:r>
+            <a:endParaRPr lang="en-US" dirty="0"/>
           </a:p>
         </p:txBody>
       </p:sp>

</xml_diff>